<commit_message>
Fix whitespace issues, add schema review strategy document.
</commit_message>
<xml_diff>
--- a/NAUPA-3-XML-Schema.pptx
+++ b/NAUPA-3-XML-Schema.pptx
@@ -2880,7 +2880,7 @@
                 <a:ea typeface="Century Gothic" charset="0"/>
                 <a:cs typeface="Century Gothic" charset="0"/>
               </a:rPr>
-              <a:t>6/15/2021</a:t>
+              <a:t>9/29/2021</a:t>
             </a:fld>
             <a:endParaRPr lang="en-US">
               <a:solidFill>
@@ -3088,7 +3088,7 @@
             <a:fld id="{7ABB63D0-41E9-7B4A-B440-EE0056E25660}" type="datetimeFigureOut">
               <a:rPr lang="en-US" smtClean="0"/>
               <a:pPr/>
-              <a:t>6/15/2021</a:t>
+              <a:t>9/29/2021</a:t>
             </a:fld>
             <a:endParaRPr lang="en-US"/>
           </a:p>
@@ -9605,13 +9605,13 @@
         </p:nvSpPr>
         <p:spPr>
           <a:xfrm>
-            <a:off x="788894" y="1727200"/>
-            <a:ext cx="10170458" cy="4683760"/>
+            <a:off x="788894" y="1727199"/>
+            <a:ext cx="10170458" cy="5046579"/>
           </a:xfrm>
         </p:spPr>
         <p:txBody>
           <a:bodyPr>
-            <a:normAutofit/>
+            <a:normAutofit lnSpcReduction="10000"/>
           </a:bodyPr>
           <a:lstStyle/>
           <a:p>
@@ -9688,6 +9688,12 @@
             <a:r>
               <a:rPr lang="en-US" sz="2000" dirty="0"/>
               <a:t> can be a number or “unbounded”</a:t>
+            </a:r>
+          </a:p>
+          <a:p>
+            <a:r>
+              <a:rPr lang="en-US" sz="2200" dirty="0"/>
+              <a:t>Can be named if desired, or if needed for re-usability</a:t>
             </a:r>
           </a:p>
         </p:txBody>

</xml_diff>